<commit_message>
plot を v8 に
細かい点を修正
</commit_message>
<xml_diff>
--- a/plot.pptx
+++ b/plot.pptx
@@ -13,8 +13,8 @@
     <p:sldId id="484" r:id="rId4"/>
     <p:sldId id="441" r:id="rId5"/>
     <p:sldId id="446" r:id="rId6"/>
-    <p:sldId id="465" r:id="rId7"/>
-    <p:sldId id="452" r:id="rId8"/>
+    <p:sldId id="487" r:id="rId7"/>
+    <p:sldId id="465" r:id="rId8"/>
     <p:sldId id="468" r:id="rId9"/>
     <p:sldId id="480" r:id="rId10"/>
     <p:sldId id="451" r:id="rId11"/>
@@ -3142,7 +3142,7 @@
             </a:r>
             <a:r>
               <a:rPr kumimoji="1" lang="en-US" altLang="ja-JP" sz="2800" dirty="0"/>
-              <a:t>v7</a:t>
+              <a:t>v8</a:t>
             </a:r>
             <a:endParaRPr kumimoji="1" lang="ja-JP" altLang="en-US" sz="2800" dirty="0"/>
           </a:p>
@@ -3687,7 +3687,14 @@
           <a:p>
             <a:r>
               <a:rPr kumimoji="1" lang="ja-JP" altLang="en-US" dirty="0"/>
-              <a:t>３点プロット：この３点で話の筋をまとめる</a:t>
+              <a:t>３点プロット：</a:t>
+            </a:r>
+            <a:br>
+              <a:rPr kumimoji="1" lang="en-US" altLang="ja-JP" dirty="0"/>
+            </a:br>
+            <a:r>
+              <a:rPr kumimoji="1" lang="ja-JP" altLang="en-US" dirty="0"/>
+              <a:t>背景，課題，提案の３点で話の筋をまとめる</a:t>
             </a:r>
           </a:p>
         </p:txBody>
@@ -6279,6 +6286,13 @@
           <a:bodyPr/>
           <a:lstStyle/>
           <a:p>
+            <a:r>
+              <a:rPr kumimoji="1" lang="ja-JP" altLang="en-US" sz="2400" dirty="0"/>
+              <a:t>余談：プロットの作成時に</a:t>
+            </a:r>
+            <a:br>
+              <a:rPr kumimoji="1" lang="en-US" altLang="ja-JP" sz="2400" dirty="0"/>
+            </a:br>
             <a:r>
               <a:rPr kumimoji="1" lang="ja-JP" altLang="en-US" sz="2400" dirty="0"/>
               <a:t>なぜ親子関係のある箇条書き（階層構造）にまとめるのか？</a:t>
@@ -11405,51 +11419,51 @@
           <a:lstStyle/>
           <a:p>
             <a:r>
-              <a:rPr lang="ja-JP" altLang="en-US" dirty="0"/>
+              <a:rPr lang="ja-JP" altLang="en-US" sz="1800" dirty="0"/>
               <a:t>イントロ</a:t>
             </a:r>
             <a:r>
-              <a:rPr kumimoji="1" lang="ja-JP" altLang="en-US" dirty="0"/>
+              <a:rPr kumimoji="1" lang="ja-JP" altLang="en-US" sz="1800" dirty="0"/>
               <a:t>プロット時の配分には自由度がある</a:t>
             </a:r>
-            <a:endParaRPr kumimoji="1" lang="en-US" altLang="ja-JP" dirty="0"/>
+            <a:endParaRPr kumimoji="1" lang="en-US" altLang="ja-JP" sz="1800" dirty="0"/>
           </a:p>
           <a:p>
             <a:pPr lvl="1"/>
             <a:r>
-              <a:rPr kumimoji="1" lang="ja-JP" altLang="en-US" dirty="0"/>
+              <a:rPr kumimoji="1" lang="ja-JP" altLang="en-US" sz="1800" dirty="0"/>
               <a:t>３点のどこをどれだけ詳しく話すかは，論文ごとに異なる</a:t>
             </a:r>
-            <a:endParaRPr kumimoji="1" lang="en-US" altLang="ja-JP" dirty="0"/>
-          </a:p>
-          <a:p>
-            <a:r>
-              <a:rPr kumimoji="1" lang="ja-JP" altLang="en-US" dirty="0"/>
+            <a:endParaRPr kumimoji="1" lang="en-US" altLang="ja-JP" sz="1800" dirty="0"/>
+          </a:p>
+          <a:p>
+            <a:r>
+              <a:rPr kumimoji="1" lang="ja-JP" altLang="en-US" sz="1800" dirty="0"/>
               <a:t>たとえば，</a:t>
             </a:r>
-            <a:endParaRPr kumimoji="1" lang="en-US" altLang="ja-JP" dirty="0"/>
+            <a:endParaRPr kumimoji="1" lang="en-US" altLang="ja-JP" sz="1800" dirty="0"/>
           </a:p>
           <a:p>
             <a:pPr lvl="1"/>
             <a:r>
-              <a:rPr kumimoji="1" lang="ja-JP" altLang="en-US" dirty="0"/>
+              <a:rPr kumimoji="1" lang="ja-JP" altLang="en-US" sz="1800" dirty="0"/>
               <a:t>背景は１つのままで，提案を増やす事が多い（上の図の例）</a:t>
             </a:r>
-            <a:endParaRPr kumimoji="1" lang="en-US" altLang="ja-JP" dirty="0"/>
+            <a:endParaRPr kumimoji="1" lang="en-US" altLang="ja-JP" sz="1800" dirty="0"/>
           </a:p>
           <a:p>
             <a:pPr lvl="1"/>
             <a:r>
-              <a:rPr kumimoji="1" lang="ja-JP" altLang="en-US" dirty="0"/>
-              <a:t>あまり一般的ではない話題の場合，背景が多めになる事も</a:t>
-            </a:r>
-            <a:endParaRPr kumimoji="1" lang="en-US" altLang="ja-JP" dirty="0"/>
+              <a:rPr kumimoji="1" lang="ja-JP" altLang="en-US" sz="1800" dirty="0"/>
+              <a:t>あまり一般的ではない話題の場合，背景が多めの配分になる事も</a:t>
+            </a:r>
+            <a:endParaRPr kumimoji="1" lang="en-US" altLang="ja-JP" sz="1800" dirty="0"/>
           </a:p>
           <a:p>
             <a:pPr lvl="1"/>
             <a:r>
-              <a:rPr kumimoji="1" lang="ja-JP" altLang="en-US" dirty="0"/>
-              <a:t>課題の発見や整理こそが大事な場合，提案は自明なため短くなる</a:t>
+              <a:rPr kumimoji="1" lang="ja-JP" altLang="en-US" sz="1800" dirty="0"/>
+              <a:t>逆に課題の発見や整理こそが大事な場合，提案は自明なため短くなる</a:t>
             </a:r>
           </a:p>
         </p:txBody>
@@ -12663,82 +12677,110 @@
           <a:bodyPr/>
           <a:lstStyle/>
           <a:p>
-            <a:r>
-              <a:rPr kumimoji="1" lang="ja-JP" altLang="en-US" dirty="0"/>
-              <a:t>イントロの重要な役割は全体を</a:t>
-            </a:r>
-            <a:r>
-              <a:rPr lang="ja-JP" altLang="en-US" dirty="0"/>
-              <a:t>要約して紹介することである</a:t>
-            </a:r>
-            <a:endParaRPr lang="en-US" altLang="ja-JP" dirty="0"/>
+            <a:pPr marL="457200" indent="-457200">
+              <a:buFont typeface="+mj-lt"/>
+              <a:buAutoNum type="arabicPeriod"/>
+            </a:pPr>
+            <a:r>
+              <a:rPr kumimoji="1" lang="ja-JP" altLang="en-US" sz="1800" dirty="0"/>
+              <a:t>イントロの重要な役割の１つは全体を</a:t>
+            </a:r>
+            <a:r>
+              <a:rPr lang="ja-JP" altLang="en-US" sz="1800" dirty="0"/>
+              <a:t>要約して紹介すること</a:t>
+            </a:r>
+            <a:endParaRPr lang="en-US" altLang="ja-JP" sz="1800" dirty="0"/>
           </a:p>
           <a:p>
             <a:pPr lvl="1"/>
             <a:r>
-              <a:rPr kumimoji="1" lang="ja-JP" altLang="en-US" dirty="0"/>
+              <a:rPr kumimoji="1" lang="ja-JP" altLang="en-US" sz="1800" dirty="0"/>
               <a:t>したがって，全体プロットは「基本的には」イントロプロットをより詳細化して作ることになる</a:t>
             </a:r>
-            <a:endParaRPr kumimoji="1" lang="en-US" altLang="ja-JP" dirty="0"/>
-          </a:p>
-          <a:p>
-            <a:r>
-              <a:rPr kumimoji="1" lang="ja-JP" altLang="en-US" dirty="0"/>
+            <a:endParaRPr kumimoji="1" lang="en-US" altLang="ja-JP" sz="1800" dirty="0"/>
+          </a:p>
+          <a:p>
+            <a:pPr marL="457200" indent="-457200">
+              <a:buFont typeface="+mj-lt"/>
+              <a:buAutoNum type="arabicPeriod"/>
+            </a:pPr>
+            <a:r>
+              <a:rPr kumimoji="1" lang="ja-JP" altLang="en-US" sz="1800" dirty="0"/>
               <a:t>イントロの</a:t>
             </a:r>
             <a:r>
-              <a:rPr lang="ja-JP" altLang="en-US" dirty="0"/>
+              <a:rPr lang="ja-JP" altLang="en-US" sz="1800" dirty="0"/>
               <a:t>もう１つの役割は</a:t>
             </a:r>
             <a:r>
-              <a:rPr kumimoji="1" lang="ja-JP" altLang="en-US" dirty="0">
+              <a:rPr kumimoji="1" lang="ja-JP" altLang="en-US" sz="1800" dirty="0">
                 <a:solidFill>
                   <a:schemeClr val="accent5"/>
                 </a:solidFill>
               </a:rPr>
               <a:t>読者や聴衆の興味をひくこと</a:t>
             </a:r>
-            <a:r>
-              <a:rPr kumimoji="1" lang="ja-JP" altLang="en-US" dirty="0"/>
-              <a:t>である</a:t>
-            </a:r>
-            <a:endParaRPr kumimoji="1" lang="en-US" altLang="ja-JP" dirty="0"/>
+            <a:endParaRPr kumimoji="1" lang="en-US" altLang="ja-JP" sz="1800" dirty="0"/>
           </a:p>
           <a:p>
             <a:pPr lvl="1"/>
             <a:r>
-              <a:rPr lang="ja-JP" altLang="en-US" dirty="0"/>
-              <a:t>読者や聴衆が興味を持つような点を抜き出して強調する</a:t>
-            </a:r>
-            <a:endParaRPr lang="en-US" altLang="ja-JP" dirty="0"/>
+              <a:rPr lang="ja-JP" altLang="en-US" sz="1800" dirty="0"/>
+              <a:t>読者や聴衆が興味を持つような点を強調する必要がある</a:t>
+            </a:r>
+            <a:endParaRPr lang="en-US" altLang="ja-JP" sz="1800" dirty="0"/>
           </a:p>
           <a:p>
             <a:pPr lvl="2"/>
             <a:r>
-              <a:rPr lang="ja-JP" altLang="en-US" dirty="0"/>
+              <a:rPr lang="ja-JP" altLang="en-US" sz="1800" dirty="0"/>
               <a:t>問題や提案の核心部分，華々しい結果など</a:t>
             </a:r>
-            <a:endParaRPr lang="en-US" altLang="ja-JP" dirty="0"/>
+            <a:endParaRPr lang="en-US" altLang="ja-JP" sz="1800" dirty="0"/>
+          </a:p>
+          <a:p>
+            <a:pPr lvl="2"/>
+            <a:r>
+              <a:rPr lang="ja-JP" altLang="en-US" sz="1800" dirty="0"/>
+              <a:t>「</a:t>
+            </a:r>
+            <a:r>
+              <a:rPr lang="en-US" altLang="ja-JP" sz="1800" dirty="0"/>
+              <a:t>200%</a:t>
+            </a:r>
+            <a:r>
+              <a:rPr lang="ja-JP" altLang="en-US" sz="1800" dirty="0"/>
+              <a:t>性能向上しました」→ 「すごいな，どうやったんだろ？」</a:t>
+            </a:r>
+            <a:endParaRPr lang="en-US" altLang="ja-JP" sz="1800" dirty="0"/>
           </a:p>
           <a:p>
             <a:pPr lvl="1"/>
             <a:r>
-              <a:rPr kumimoji="1" lang="ja-JP" altLang="en-US" dirty="0"/>
+              <a:rPr kumimoji="1" lang="ja-JP" altLang="en-US" sz="1800" dirty="0"/>
               <a:t>このため，「</a:t>
             </a:r>
             <a:r>
-              <a:rPr kumimoji="1" lang="ja-JP" altLang="en-US" dirty="0">
+              <a:rPr kumimoji="1" lang="ja-JP" altLang="en-US" sz="1800" dirty="0">
                 <a:solidFill>
                   <a:schemeClr val="accent5"/>
                 </a:solidFill>
               </a:rPr>
-              <a:t>イントロプロットを詳細化したもの＝全体プロット」ではないと考えた方がよい</a:t>
-            </a:r>
-            <a:endParaRPr kumimoji="1" lang="en-US" altLang="ja-JP" dirty="0">
-              <a:solidFill>
-                <a:schemeClr val="accent5"/>
-              </a:solidFill>
-            </a:endParaRPr>
+              <a:t>イントロプロットを詳細化したもの＝全体プロット」ではない</a:t>
+            </a:r>
+            <a:r>
+              <a:rPr kumimoji="1" lang="ja-JP" altLang="en-US" sz="1800" dirty="0"/>
+              <a:t>と考えた方がよい</a:t>
+            </a:r>
+            <a:endParaRPr kumimoji="1" lang="en-US" altLang="ja-JP" sz="1800" dirty="0"/>
+          </a:p>
+          <a:p>
+            <a:pPr lvl="2"/>
+            <a:r>
+              <a:rPr kumimoji="1" lang="ja-JP" altLang="en-US" sz="1800" dirty="0"/>
+              <a:t>イントロでは問題の深刻さや提案のすごさをより強調して重きを置くから</a:t>
+            </a:r>
+            <a:endParaRPr kumimoji="1" lang="en-US" altLang="ja-JP" sz="1800" dirty="0"/>
           </a:p>
         </p:txBody>
       </p:sp>
@@ -12803,7 +12845,7 @@
           <a:p>
             <a:r>
               <a:rPr kumimoji="1" lang="ja-JP" altLang="en-US" dirty="0"/>
-              <a:t>イントロと全体の構造が違う例</a:t>
+              <a:t>イントロと全体のプロットで構造が違う例</a:t>
             </a:r>
           </a:p>
         </p:txBody>
@@ -12847,14 +12889,7 @@
             <a:pPr lvl="1"/>
             <a:r>
               <a:rPr lang="ja-JP" altLang="en-US" dirty="0"/>
-              <a:t>しかし非常に一般的であるか，本筋には関係なかったりして</a:t>
-            </a:r>
-            <a:br>
-              <a:rPr lang="en-US" altLang="ja-JP" dirty="0"/>
-            </a:br>
-            <a:r>
-              <a:rPr lang="ja-JP" altLang="en-US" dirty="0"/>
-              <a:t>論文本文ではそれ以降登場しない事がある</a:t>
+              <a:t>しかし，非常に一般的であるか，あるいは本筋には関係なかったりして論文本文ではそれ以降登場しない事がある</a:t>
             </a:r>
             <a:endParaRPr lang="en-US" altLang="ja-JP" dirty="0"/>
           </a:p>
@@ -13046,7 +13081,7 @@
           <a:p>
             <a:r>
               <a:rPr lang="ja-JP" altLang="en-US" dirty="0"/>
-              <a:t>３点プロットは，いわば「イントロプロットのプロット」</a:t>
+              <a:t>３点プロットは，いわば「プロットのプロット」</a:t>
             </a:r>
             <a:endParaRPr lang="en-US" altLang="ja-JP" dirty="0"/>
           </a:p>
@@ -13054,7 +13089,14 @@
             <a:pPr lvl="1"/>
             <a:r>
               <a:rPr lang="ja-JP" altLang="en-US" dirty="0"/>
-              <a:t>３点プロットで整理した内容をもとに，肉付けして全体プロットを作る</a:t>
+              <a:t>基本的には３点プロットで整理した内容をもとに，</a:t>
+            </a:r>
+            <a:br>
+              <a:rPr lang="en-US" altLang="ja-JP" dirty="0"/>
+            </a:br>
+            <a:r>
+              <a:rPr lang="ja-JP" altLang="en-US" dirty="0"/>
+              <a:t>肉付けして全体プロットを作る</a:t>
             </a:r>
             <a:endParaRPr lang="en-US" altLang="ja-JP" dirty="0"/>
           </a:p>
@@ -13817,23 +13859,7 @@
                   <a:schemeClr val="accent5"/>
                 </a:solidFill>
               </a:rPr>
-              <a:t>前から読んでわかる順序に論理を展開し，</a:t>
-            </a:r>
-            <a:endParaRPr lang="en-US" altLang="ja-JP" dirty="0">
-              <a:solidFill>
-                <a:schemeClr val="accent5"/>
-              </a:solidFill>
-            </a:endParaRPr>
-          </a:p>
-          <a:p>
-            <a:pPr lvl="2"/>
-            <a:r>
-              <a:rPr lang="ja-JP" altLang="en-US" dirty="0">
-                <a:solidFill>
-                  <a:schemeClr val="accent5"/>
-                </a:solidFill>
-              </a:rPr>
-              <a:t>それぞれにつなぎを入れる必要がある</a:t>
+              <a:t>前から読んでわかる順序に論理を展開し，それぞれにつなぎを入れる必要がある</a:t>
             </a:r>
             <a:endParaRPr lang="en-US" altLang="ja-JP" dirty="0">
               <a:solidFill>
@@ -21553,7 +21579,7 @@
             </a:br>
             <a:r>
               <a:rPr lang="ja-JP" altLang="en-US" sz="1800" dirty="0"/>
-              <a:t>論文や発表スライドの作成中の各段階に合わせてこれらを作る</a:t>
+              <a:t>論文や発表スライドの作成段階に応じて，これらを作る</a:t>
             </a:r>
             <a:endParaRPr kumimoji="1" lang="ja-JP" altLang="en-US" dirty="0"/>
           </a:p>
@@ -21594,7 +21620,23 @@
             <a:pPr lvl="1"/>
             <a:r>
               <a:rPr kumimoji="1" lang="ja-JP" altLang="en-US" dirty="0"/>
-              <a:t>３つの項目にまとめたプロット</a:t>
+              <a:t>話全体を３つの項目にまとめた形のプロット</a:t>
+            </a:r>
+            <a:endParaRPr kumimoji="1" lang="en-US" altLang="ja-JP" dirty="0"/>
+          </a:p>
+          <a:p>
+            <a:pPr lvl="1"/>
+            <a:r>
+              <a:rPr kumimoji="1" lang="ja-JP" altLang="en-US" dirty="0"/>
+              <a:t>イントロ</a:t>
+            </a:r>
+            <a:r>
+              <a:rPr kumimoji="1" lang="en-US" altLang="ja-JP" dirty="0"/>
+              <a:t>/</a:t>
+            </a:r>
+            <a:r>
+              <a:rPr kumimoji="1" lang="ja-JP" altLang="en-US" dirty="0"/>
+              <a:t>全体プロットと比べると抽象的な内容になる</a:t>
             </a:r>
             <a:endParaRPr kumimoji="1" lang="en-US" altLang="ja-JP" dirty="0"/>
           </a:p>
@@ -21616,14 +21658,6 @@
               <a:t>論文やスライドのイントロのプロット</a:t>
             </a:r>
             <a:endParaRPr lang="en-US" altLang="ja-JP" dirty="0"/>
-          </a:p>
-          <a:p>
-            <a:pPr lvl="1"/>
-            <a:r>
-              <a:rPr kumimoji="1" lang="ja-JP" altLang="en-US" dirty="0"/>
-              <a:t>ここは全体のものとは正確が違うので個別にプロットを作った方が良い</a:t>
-            </a:r>
-            <a:endParaRPr kumimoji="1" lang="en-US" altLang="ja-JP" dirty="0"/>
           </a:p>
           <a:p>
             <a:pPr marL="457200" indent="-457200">
@@ -21734,8 +21768,9 @@
           <a:p>
             <a:r>
               <a:rPr lang="ja-JP" altLang="en-US" dirty="0"/>
-              <a:t>まず３点プロットから作り始める</a:t>
-            </a:r>
+              <a:t>３点プロットとは</a:t>
+            </a:r>
+            <a:endParaRPr lang="en-US" altLang="ja-JP" dirty="0"/>
           </a:p>
         </p:txBody>
       </p:sp>
@@ -21761,12 +21796,24 @@
           <a:lstStyle/>
           <a:p>
             <a:r>
+              <a:rPr lang="ja-JP" altLang="en-US" dirty="0">
+                <a:solidFill>
+                  <a:schemeClr val="accent5"/>
+                </a:solidFill>
+              </a:rPr>
+              <a:t>３点プロットはいわば「プロットのプロット」</a:t>
+            </a:r>
+            <a:endParaRPr lang="en-US" altLang="ja-JP" dirty="0">
+              <a:solidFill>
+                <a:schemeClr val="accent5"/>
+              </a:solidFill>
+            </a:endParaRPr>
+          </a:p>
+          <a:p>
+            <a:pPr lvl="1"/>
+            <a:r>
               <a:rPr lang="ja-JP" altLang="en-US" dirty="0"/>
-              <a:t>イントロプロットや全体</a:t>
-            </a:r>
-            <a:r>
-              <a:rPr kumimoji="1" lang="ja-JP" altLang="en-US" dirty="0"/>
-              <a:t>プロットをいきなり作るのは難しい</a:t>
+              <a:t>「背景→課題→提案」の３要素が何なのかをまとめたもの</a:t>
             </a:r>
             <a:endParaRPr lang="en-US" altLang="ja-JP" dirty="0"/>
           </a:p>
@@ -21774,54 +21821,23 @@
             <a:pPr lvl="1"/>
             <a:r>
               <a:rPr lang="ja-JP" altLang="en-US" dirty="0"/>
-              <a:t>自由度が高すぎて，いきなりまとめるのが難しい</a:t>
+              <a:t>各要素が何なのかをはっきりさせ，その流れを明確にする</a:t>
             </a:r>
             <a:endParaRPr lang="en-US" altLang="ja-JP" dirty="0"/>
           </a:p>
           <a:p>
+            <a:pPr lvl="1"/>
             <a:r>
               <a:rPr lang="ja-JP" altLang="en-US" dirty="0"/>
-              <a:t>目標規定文を最初に作るのも難しい</a:t>
-            </a:r>
-            <a:endParaRPr lang="en-US" altLang="ja-JP" dirty="0"/>
-          </a:p>
-          <a:p>
-            <a:pPr lvl="1"/>
-            <a:r>
-              <a:rPr lang="ja-JP" altLang="en-US" dirty="0"/>
-              <a:t>本当に大事な事だけを１つの文に集約</a:t>
-            </a:r>
-            <a:r>
-              <a:rPr lang="en-US" altLang="ja-JP" dirty="0"/>
-              <a:t>/</a:t>
-            </a:r>
-            <a:r>
-              <a:rPr lang="ja-JP" altLang="en-US" dirty="0"/>
-              <a:t>圧縮する必要がある</a:t>
-            </a:r>
-            <a:endParaRPr lang="en-US" altLang="ja-JP" dirty="0"/>
-          </a:p>
-          <a:p>
-            <a:pPr lvl="1"/>
-            <a:r>
-              <a:rPr lang="ja-JP" altLang="en-US" dirty="0"/>
-              <a:t>しかし，何が真に大事なのかは最初はわからない</a:t>
-            </a:r>
-            <a:endParaRPr lang="en-US" altLang="ja-JP" dirty="0"/>
-          </a:p>
-          <a:p>
-            <a:r>
-              <a:rPr lang="ja-JP" altLang="en-US" dirty="0"/>
-              <a:t>３点プロットが規模的にちょうどよい</a:t>
-            </a:r>
-            <a:endParaRPr lang="en-US" altLang="ja-JP" dirty="0"/>
+              <a:t>これを膨らませて全体プロットなどを作る</a:t>
+            </a:r>
           </a:p>
         </p:txBody>
       </p:sp>
     </p:spTree>
     <p:extLst>
       <p:ext uri="{BB962C8B-B14F-4D97-AF65-F5344CB8AC3E}">
-        <p14:creationId xmlns:p14="http://schemas.microsoft.com/office/powerpoint/2010/main" val="2651193988"/>
+        <p14:creationId xmlns:p14="http://schemas.microsoft.com/office/powerpoint/2010/main" val="1390950572"/>
       </p:ext>
     </p:extLst>
   </p:cSld>
@@ -21879,9 +21895,8 @@
           <a:p>
             <a:r>
               <a:rPr lang="ja-JP" altLang="en-US" dirty="0"/>
-              <a:t>３点プロットは最初に作るのにちょうどよい</a:t>
-            </a:r>
-            <a:endParaRPr lang="en-US" altLang="ja-JP" dirty="0"/>
+              <a:t>まず３点プロットから作り始める</a:t>
+            </a:r>
           </a:p>
         </p:txBody>
       </p:sp>
@@ -21907,12 +21922,62 @@
           <a:lstStyle/>
           <a:p>
             <a:r>
+              <a:rPr lang="ja-JP" altLang="en-US" dirty="0"/>
+              <a:t>イントロプロットや全体</a:t>
+            </a:r>
+            <a:r>
+              <a:rPr kumimoji="1" lang="ja-JP" altLang="en-US" dirty="0"/>
+              <a:t>プロットをいきなり作るのは難しい</a:t>
+            </a:r>
+            <a:endParaRPr lang="en-US" altLang="ja-JP" dirty="0"/>
+          </a:p>
+          <a:p>
+            <a:pPr lvl="1"/>
+            <a:r>
+              <a:rPr lang="ja-JP" altLang="en-US" dirty="0"/>
+              <a:t>自由度が高すぎて，いきなりまとめるのが難しい</a:t>
+            </a:r>
+            <a:endParaRPr lang="en-US" altLang="ja-JP" dirty="0"/>
+          </a:p>
+          <a:p>
+            <a:r>
+              <a:rPr lang="ja-JP" altLang="en-US" dirty="0"/>
+              <a:t>目標規定文を最初に作るのも難しい</a:t>
+            </a:r>
+            <a:endParaRPr lang="en-US" altLang="ja-JP" dirty="0"/>
+          </a:p>
+          <a:p>
+            <a:pPr lvl="1"/>
+            <a:r>
+              <a:rPr lang="ja-JP" altLang="en-US" dirty="0"/>
+              <a:t>本当に大事な事だけを１つの文に集約</a:t>
+            </a:r>
+            <a:r>
+              <a:rPr lang="en-US" altLang="ja-JP" dirty="0"/>
+              <a:t>/</a:t>
+            </a:r>
+            <a:r>
+              <a:rPr lang="ja-JP" altLang="en-US" dirty="0"/>
+              <a:t>圧縮する必要がある</a:t>
+            </a:r>
+            <a:endParaRPr lang="en-US" altLang="ja-JP" dirty="0"/>
+          </a:p>
+          <a:p>
+            <a:pPr lvl="1"/>
+            <a:r>
+              <a:rPr lang="ja-JP" altLang="en-US" dirty="0"/>
+              <a:t>しかし，何が真に大事なのかは最初はわからない</a:t>
+            </a:r>
+            <a:endParaRPr lang="en-US" altLang="ja-JP" dirty="0"/>
+          </a:p>
+          <a:p>
+            <a:r>
               <a:rPr lang="ja-JP" altLang="en-US" dirty="0">
                 <a:solidFill>
                   <a:schemeClr val="accent5"/>
                 </a:solidFill>
               </a:rPr>
-              <a:t>３点プロットはいわば「（全体の）プロットのプロット」</a:t>
+              <a:t>３点プロットが規模的に最初に手をつけるのにちょうどよい</a:t>
             </a:r>
             <a:endParaRPr lang="en-US" altLang="ja-JP" dirty="0">
               <a:solidFill>
@@ -21924,37 +21989,15 @@
             <a:pPr lvl="1"/>
             <a:r>
               <a:rPr lang="ja-JP" altLang="en-US" dirty="0"/>
-              <a:t>まず「背景→課題→提案」の３点の流れを明確にする</a:t>
+              <a:t>規模が小さくかつ形式が決まっているので，考えやすい</a:t>
             </a:r>
             <a:endParaRPr lang="en-US" altLang="ja-JP" dirty="0"/>
           </a:p>
           <a:p>
-            <a:pPr lvl="2"/>
+            <a:pPr lvl="1"/>
             <a:r>
               <a:rPr lang="ja-JP" altLang="en-US" dirty="0"/>
-              <a:t>各要素が何なのかをはっきりさせる</a:t>
-            </a:r>
-            <a:endParaRPr lang="en-US" altLang="ja-JP" dirty="0"/>
-          </a:p>
-          <a:p>
-            <a:pPr lvl="1"/>
-            <a:r>
-              <a:rPr lang="ja-JP" altLang="en-US" dirty="0"/>
-              <a:t>これを元に，内容を膨らませて完全プロットなど作る</a:t>
-            </a:r>
-          </a:p>
-          <a:p>
-            <a:r>
-              <a:rPr lang="ja-JP" altLang="en-US" dirty="0"/>
-              <a:t>規模が小さくかつ形式が決まっているので，考えやすい</a:t>
-            </a:r>
-            <a:endParaRPr lang="en-US" altLang="ja-JP" dirty="0"/>
-          </a:p>
-          <a:p>
-            <a:pPr lvl="1"/>
-            <a:r>
-              <a:rPr lang="ja-JP" altLang="en-US" dirty="0"/>
-              <a:t>スライド１枚程度にまとまる</a:t>
+              <a:t>典型的にはスライド１枚程度にまとめる</a:t>
             </a:r>
             <a:endParaRPr lang="en-US" altLang="ja-JP" dirty="0"/>
           </a:p>
@@ -21963,17 +22006,6 @@
             <a:r>
               <a:rPr lang="ja-JP" altLang="en-US" dirty="0"/>
               <a:t>短いので，まず取っ掛かりとして始めやすい</a:t>
-            </a:r>
-            <a:endParaRPr lang="en-US" altLang="ja-JP" dirty="0"/>
-          </a:p>
-          <a:p>
-            <a:r>
-              <a:rPr lang="ja-JP" altLang="en-US" dirty="0">
-                <a:solidFill>
-                  <a:schemeClr val="accent5"/>
-                </a:solidFill>
-              </a:rPr>
-              <a:t>３点プロットに実際に取り掛かる前に，この資料は最後まで読んでほしい</a:t>
             </a:r>
             <a:endParaRPr lang="en-US" altLang="ja-JP" dirty="0">
               <a:solidFill>
@@ -21981,20 +22013,12 @@
               </a:solidFill>
             </a:endParaRPr>
           </a:p>
-          <a:p>
-            <a:pPr lvl="1"/>
-            <a:r>
-              <a:rPr lang="ja-JP" altLang="en-US" dirty="0"/>
-              <a:t>最終的に全体プロットを作るところまでの道筋を意識してほしい</a:t>
-            </a:r>
-            <a:endParaRPr lang="en-US" altLang="ja-JP" dirty="0"/>
-          </a:p>
         </p:txBody>
       </p:sp>
     </p:spTree>
     <p:extLst>
       <p:ext uri="{BB962C8B-B14F-4D97-AF65-F5344CB8AC3E}">
-        <p14:creationId xmlns:p14="http://schemas.microsoft.com/office/powerpoint/2010/main" val="2500340230"/>
+        <p14:creationId xmlns:p14="http://schemas.microsoft.com/office/powerpoint/2010/main" val="2651193988"/>
       </p:ext>
     </p:extLst>
   </p:cSld>

</xml_diff>